<commit_message>
update exec add participants to 20
</commit_message>
<xml_diff>
--- a/Pictures/introduction.pptx
+++ b/Pictures/introduction.pptx
@@ -197,7 +197,7 @@
           <a:p>
             <a:fld id="{C0546B5F-B17E-4A11-A9CD-A10C644EC78D}" type="datetimeFigureOut">
               <a:rPr lang="zh-CN" altLang="en-US" smtClean="0"/>
-              <a:t>2019/1/4</a:t>
+              <a:t>2020/9/25</a:t>
             </a:fld>
             <a:endParaRPr lang="zh-CN" altLang="en-US"/>
           </a:p>
@@ -695,7 +695,7 @@
           <a:p>
             <a:fld id="{22C6D5CB-9E91-4D8B-8A6F-E7E64CE5E759}" type="datetimeFigureOut">
               <a:rPr lang="zh-CN" altLang="en-US" smtClean="0"/>
-              <a:t>2019/1/4</a:t>
+              <a:t>2020/9/25</a:t>
             </a:fld>
             <a:endParaRPr lang="zh-CN" altLang="en-US"/>
           </a:p>
@@ -893,7 +893,7 @@
           <a:p>
             <a:fld id="{22C6D5CB-9E91-4D8B-8A6F-E7E64CE5E759}" type="datetimeFigureOut">
               <a:rPr lang="zh-CN" altLang="en-US" smtClean="0"/>
-              <a:t>2019/1/4</a:t>
+              <a:t>2020/9/25</a:t>
             </a:fld>
             <a:endParaRPr lang="zh-CN" altLang="en-US"/>
           </a:p>
@@ -1101,7 +1101,7 @@
           <a:p>
             <a:fld id="{22C6D5CB-9E91-4D8B-8A6F-E7E64CE5E759}" type="datetimeFigureOut">
               <a:rPr lang="zh-CN" altLang="en-US" smtClean="0"/>
-              <a:t>2019/1/4</a:t>
+              <a:t>2020/9/25</a:t>
             </a:fld>
             <a:endParaRPr lang="zh-CN" altLang="en-US"/>
           </a:p>
@@ -1299,7 +1299,7 @@
           <a:p>
             <a:fld id="{22C6D5CB-9E91-4D8B-8A6F-E7E64CE5E759}" type="datetimeFigureOut">
               <a:rPr lang="zh-CN" altLang="en-US" smtClean="0"/>
-              <a:t>2019/1/4</a:t>
+              <a:t>2020/9/25</a:t>
             </a:fld>
             <a:endParaRPr lang="zh-CN" altLang="en-US"/>
           </a:p>
@@ -1574,7 +1574,7 @@
           <a:p>
             <a:fld id="{22C6D5CB-9E91-4D8B-8A6F-E7E64CE5E759}" type="datetimeFigureOut">
               <a:rPr lang="zh-CN" altLang="en-US" smtClean="0"/>
-              <a:t>2019/1/4</a:t>
+              <a:t>2020/9/25</a:t>
             </a:fld>
             <a:endParaRPr lang="zh-CN" altLang="en-US"/>
           </a:p>
@@ -1839,7 +1839,7 @@
           <a:p>
             <a:fld id="{22C6D5CB-9E91-4D8B-8A6F-E7E64CE5E759}" type="datetimeFigureOut">
               <a:rPr lang="zh-CN" altLang="en-US" smtClean="0"/>
-              <a:t>2019/1/4</a:t>
+              <a:t>2020/9/25</a:t>
             </a:fld>
             <a:endParaRPr lang="zh-CN" altLang="en-US"/>
           </a:p>
@@ -2251,7 +2251,7 @@
           <a:p>
             <a:fld id="{22C6D5CB-9E91-4D8B-8A6F-E7E64CE5E759}" type="datetimeFigureOut">
               <a:rPr lang="zh-CN" altLang="en-US" smtClean="0"/>
-              <a:t>2019/1/4</a:t>
+              <a:t>2020/9/25</a:t>
             </a:fld>
             <a:endParaRPr lang="zh-CN" altLang="en-US"/>
           </a:p>
@@ -2392,7 +2392,7 @@
           <a:p>
             <a:fld id="{22C6D5CB-9E91-4D8B-8A6F-E7E64CE5E759}" type="datetimeFigureOut">
               <a:rPr lang="zh-CN" altLang="en-US" smtClean="0"/>
-              <a:t>2019/1/4</a:t>
+              <a:t>2020/9/25</a:t>
             </a:fld>
             <a:endParaRPr lang="zh-CN" altLang="en-US"/>
           </a:p>
@@ -2505,7 +2505,7 @@
           <a:p>
             <a:fld id="{22C6D5CB-9E91-4D8B-8A6F-E7E64CE5E759}" type="datetimeFigureOut">
               <a:rPr lang="zh-CN" altLang="en-US" smtClean="0"/>
-              <a:t>2019/1/4</a:t>
+              <a:t>2020/9/25</a:t>
             </a:fld>
             <a:endParaRPr lang="zh-CN" altLang="en-US"/>
           </a:p>
@@ -2816,7 +2816,7 @@
           <a:p>
             <a:fld id="{22C6D5CB-9E91-4D8B-8A6F-E7E64CE5E759}" type="datetimeFigureOut">
               <a:rPr lang="zh-CN" altLang="en-US" smtClean="0"/>
-              <a:t>2019/1/4</a:t>
+              <a:t>2020/9/25</a:t>
             </a:fld>
             <a:endParaRPr lang="zh-CN" altLang="en-US"/>
           </a:p>
@@ -3104,7 +3104,7 @@
           <a:p>
             <a:fld id="{22C6D5CB-9E91-4D8B-8A6F-E7E64CE5E759}" type="datetimeFigureOut">
               <a:rPr lang="zh-CN" altLang="en-US" smtClean="0"/>
-              <a:t>2019/1/4</a:t>
+              <a:t>2020/9/25</a:t>
             </a:fld>
             <a:endParaRPr lang="zh-CN" altLang="en-US"/>
           </a:p>
@@ -3345,7 +3345,7 @@
           <a:p>
             <a:fld id="{22C6D5CB-9E91-4D8B-8A6F-E7E64CE5E759}" type="datetimeFigureOut">
               <a:rPr lang="zh-CN" altLang="en-US" smtClean="0"/>
-              <a:t>2019/1/4</a:t>
+              <a:t>2020/9/25</a:t>
             </a:fld>
             <a:endParaRPr lang="zh-CN" altLang="en-US"/>
           </a:p>

</xml_diff>